<commit_message>
Dodane slike se za sporedi
</commit_message>
<xml_diff>
--- a/SP_predstavitev.pptx
+++ b/SP_predstavitev.pptx
@@ -10,6 +10,7 @@
     <p:sldId id="258" r:id="rId4"/>
     <p:sldId id="260" r:id="rId5"/>
     <p:sldId id="261" r:id="rId6"/>
+    <p:sldId id="262" r:id="rId7"/>
   </p:sldIdLst>
   <p:sldSz cx="9144000" cy="6858000" type="screen4x3"/>
   <p:notesSz cx="6858000" cy="9144000"/>
@@ -330,7 +331,8 @@
           <a:p>
             <a:fld id="{70FAA508-F0CD-46EA-95FB-26B559A0B5D9}" type="datetimeFigureOut">
               <a:rPr lang="en-US" smtClean="0"/>
-              <a:t>11/06/15</a:t>
+              <a:pPr/>
+              <a:t>6/12/2015</a:t>
             </a:fld>
             <a:endParaRPr lang="en-US"/>
           </a:p>
@@ -372,6 +374,7 @@
           <a:p>
             <a:fld id="{4A822907-8A9D-4F6B-98F6-913902AD56B5}" type="slidenum">
               <a:rPr lang="en-US" smtClean="0"/>
+              <a:pPr/>
               <a:t>‹#›</a:t>
             </a:fld>
             <a:endParaRPr lang="en-US"/>
@@ -651,7 +654,8 @@
           <a:p>
             <a:fld id="{70FAA508-F0CD-46EA-95FB-26B559A0B5D9}" type="datetimeFigureOut">
               <a:rPr lang="en-US" smtClean="0"/>
-              <a:t>11/06/15</a:t>
+              <a:pPr/>
+              <a:t>6/12/2015</a:t>
             </a:fld>
             <a:endParaRPr lang="en-US"/>
           </a:p>
@@ -693,6 +697,7 @@
           <a:p>
             <a:fld id="{4A822907-8A9D-4F6B-98F6-913902AD56B5}" type="slidenum">
               <a:rPr lang="en-US" smtClean="0"/>
+              <a:pPr/>
               <a:t>‹#›</a:t>
             </a:fld>
             <a:endParaRPr lang="en-US"/>
@@ -928,7 +933,8 @@
           <a:p>
             <a:fld id="{70FAA508-F0CD-46EA-95FB-26B559A0B5D9}" type="datetimeFigureOut">
               <a:rPr lang="en-US" smtClean="0"/>
-              <a:t>11/06/15</a:t>
+              <a:pPr/>
+              <a:t>6/12/2015</a:t>
             </a:fld>
             <a:endParaRPr lang="en-US"/>
           </a:p>
@@ -1222,7 +1228,8 @@
           <a:p>
             <a:fld id="{70FAA508-F0CD-46EA-95FB-26B559A0B5D9}" type="datetimeFigureOut">
               <a:rPr lang="en-US" smtClean="0"/>
-              <a:t>11/06/15</a:t>
+              <a:pPr/>
+              <a:t>6/12/2015</a:t>
             </a:fld>
             <a:endParaRPr lang="en-US"/>
           </a:p>
@@ -1551,7 +1558,8 @@
           <a:p>
             <a:fld id="{70FAA508-F0CD-46EA-95FB-26B559A0B5D9}" type="datetimeFigureOut">
               <a:rPr lang="en-US" smtClean="0"/>
-              <a:t>11/06/15</a:t>
+              <a:pPr/>
+              <a:t>6/12/2015</a:t>
             </a:fld>
             <a:endParaRPr lang="en-US"/>
           </a:p>
@@ -1802,7 +1810,8 @@
           <a:p>
             <a:fld id="{70FAA508-F0CD-46EA-95FB-26B559A0B5D9}" type="datetimeFigureOut">
               <a:rPr lang="en-US" smtClean="0"/>
-              <a:t>11/06/15</a:t>
+              <a:pPr/>
+              <a:t>6/12/2015</a:t>
             </a:fld>
             <a:endParaRPr lang="en-US"/>
           </a:p>
@@ -1844,6 +1853,7 @@
           <a:p>
             <a:fld id="{4A822907-8A9D-4F6B-98F6-913902AD56B5}" type="slidenum">
               <a:rPr lang="en-US" smtClean="0"/>
+              <a:pPr/>
               <a:t>‹#›</a:t>
             </a:fld>
             <a:endParaRPr lang="en-US"/>
@@ -1981,7 +1991,8 @@
           <a:p>
             <a:fld id="{70FAA508-F0CD-46EA-95FB-26B559A0B5D9}" type="datetimeFigureOut">
               <a:rPr lang="en-US" smtClean="0"/>
-              <a:t>11/06/15</a:t>
+              <a:pPr/>
+              <a:t>6/12/2015</a:t>
             </a:fld>
             <a:endParaRPr lang="en-US"/>
           </a:p>
@@ -2023,6 +2034,7 @@
           <a:p>
             <a:fld id="{4A822907-8A9D-4F6B-98F6-913902AD56B5}" type="slidenum">
               <a:rPr lang="en-US" smtClean="0"/>
+              <a:pPr/>
               <a:t>‹#›</a:t>
             </a:fld>
             <a:endParaRPr lang="en-US"/>
@@ -2150,7 +2162,8 @@
           <a:p>
             <a:fld id="{70FAA508-F0CD-46EA-95FB-26B559A0B5D9}" type="datetimeFigureOut">
               <a:rPr lang="en-US" smtClean="0"/>
-              <a:t>11/06/15</a:t>
+              <a:pPr/>
+              <a:t>6/12/2015</a:t>
             </a:fld>
             <a:endParaRPr lang="en-US"/>
           </a:p>
@@ -2192,6 +2205,7 @@
           <a:p>
             <a:fld id="{4A822907-8A9D-4F6B-98F6-913902AD56B5}" type="slidenum">
               <a:rPr lang="en-US" smtClean="0"/>
+              <a:pPr/>
               <a:t>‹#›</a:t>
             </a:fld>
             <a:endParaRPr lang="en-US"/>
@@ -2419,7 +2433,8 @@
           <a:p>
             <a:fld id="{70FAA508-F0CD-46EA-95FB-26B559A0B5D9}" type="datetimeFigureOut">
               <a:rPr lang="en-US" smtClean="0"/>
-              <a:t>11/06/15</a:t>
+              <a:pPr/>
+              <a:t>6/12/2015</a:t>
             </a:fld>
             <a:endParaRPr lang="en-US"/>
           </a:p>
@@ -2726,7 +2741,8 @@
           <a:p>
             <a:fld id="{70FAA508-F0CD-46EA-95FB-26B559A0B5D9}" type="datetimeFigureOut">
               <a:rPr lang="en-US" smtClean="0"/>
-              <a:t>11/06/15</a:t>
+              <a:pPr/>
+              <a:t>6/12/2015</a:t>
             </a:fld>
             <a:endParaRPr lang="en-US"/>
           </a:p>
@@ -2768,6 +2784,7 @@
           <a:p>
             <a:fld id="{4A822907-8A9D-4F6B-98F6-913902AD56B5}" type="slidenum">
               <a:rPr lang="en-US" smtClean="0"/>
+              <a:pPr/>
               <a:t>‹#›</a:t>
             </a:fld>
             <a:endParaRPr lang="en-US"/>
@@ -3018,7 +3035,8 @@
           <a:p>
             <a:fld id="{70FAA508-F0CD-46EA-95FB-26B559A0B5D9}" type="datetimeFigureOut">
               <a:rPr lang="en-US" smtClean="0"/>
-              <a:t>11/06/15</a:t>
+              <a:pPr/>
+              <a:t>6/12/2015</a:t>
             </a:fld>
             <a:endParaRPr lang="en-US"/>
           </a:p>
@@ -3060,6 +3078,7 @@
           <a:p>
             <a:fld id="{4A822907-8A9D-4F6B-98F6-913902AD56B5}" type="slidenum">
               <a:rPr lang="en-US" smtClean="0"/>
+              <a:pPr/>
               <a:t>‹#›</a:t>
             </a:fld>
             <a:endParaRPr lang="en-US"/>
@@ -3448,7 +3467,8 @@
           <a:p>
             <a:fld id="{70FAA508-F0CD-46EA-95FB-26B559A0B5D9}" type="datetimeFigureOut">
               <a:rPr lang="en-US" smtClean="0"/>
-              <a:t>11/06/15</a:t>
+              <a:pPr/>
+              <a:t>6/12/2015</a:t>
             </a:fld>
             <a:endParaRPr lang="en-US"/>
           </a:p>
@@ -3495,6 +3515,7 @@
           <a:p>
             <a:fld id="{4A822907-8A9D-4F6B-98F6-913902AD56B5}" type="slidenum">
               <a:rPr lang="en-US" smtClean="0"/>
+              <a:pPr/>
               <a:t>‹#›</a:t>
             </a:fld>
             <a:endParaRPr lang="en-US"/>
@@ -3794,7 +3815,8 @@
           <a:p>
             <a:fld id="{70FAA508-F0CD-46EA-95FB-26B559A0B5D9}" type="datetimeFigureOut">
               <a:rPr lang="en-US" smtClean="0"/>
-              <a:t>11/06/15</a:t>
+              <a:pPr/>
+              <a:t>6/12/2015</a:t>
             </a:fld>
             <a:endParaRPr lang="en-US"/>
           </a:p>
@@ -3836,6 +3858,7 @@
           <a:p>
             <a:fld id="{4A822907-8A9D-4F6B-98F6-913902AD56B5}" type="slidenum">
               <a:rPr lang="en-US" smtClean="0"/>
+              <a:pPr/>
               <a:t>‹#›</a:t>
             </a:fld>
             <a:endParaRPr lang="en-US"/>
@@ -3884,7 +3907,8 @@
           <a:p>
             <a:fld id="{70FAA508-F0CD-46EA-95FB-26B559A0B5D9}" type="datetimeFigureOut">
               <a:rPr lang="en-US" smtClean="0"/>
-              <a:t>11/06/15</a:t>
+              <a:pPr/>
+              <a:t>6/12/2015</a:t>
             </a:fld>
             <a:endParaRPr lang="en-US"/>
           </a:p>
@@ -3926,6 +3950,7 @@
           <a:p>
             <a:fld id="{4A822907-8A9D-4F6B-98F6-913902AD56B5}" type="slidenum">
               <a:rPr lang="en-US" smtClean="0"/>
+              <a:pPr/>
               <a:t>‹#›</a:t>
             </a:fld>
             <a:endParaRPr lang="en-US"/>
@@ -4221,7 +4246,8 @@
           <a:p>
             <a:fld id="{70FAA508-F0CD-46EA-95FB-26B559A0B5D9}" type="datetimeFigureOut">
               <a:rPr lang="en-US" smtClean="0"/>
-              <a:t>11/06/15</a:t>
+              <a:pPr/>
+              <a:t>6/12/2015</a:t>
             </a:fld>
             <a:endParaRPr lang="en-US"/>
           </a:p>
@@ -4263,6 +4289,7 @@
           <a:p>
             <a:fld id="{4A822907-8A9D-4F6B-98F6-913902AD56B5}" type="slidenum">
               <a:rPr lang="en-US" smtClean="0"/>
+              <a:pPr/>
               <a:t>‹#›</a:t>
             </a:fld>
             <a:endParaRPr lang="en-US"/>
@@ -4433,7 +4460,8 @@
           <a:p>
             <a:fld id="{70FAA508-F0CD-46EA-95FB-26B559A0B5D9}" type="datetimeFigureOut">
               <a:rPr lang="en-US" smtClean="0"/>
-              <a:t>11/06/15</a:t>
+              <a:pPr/>
+              <a:t>6/12/2015</a:t>
             </a:fld>
             <a:endParaRPr lang="en-US"/>
           </a:p>
@@ -4513,6 +4541,7 @@
           <a:p>
             <a:fld id="{4A822907-8A9D-4F6B-98F6-913902AD56B5}" type="slidenum">
               <a:rPr lang="en-US" smtClean="0"/>
+              <a:pPr/>
               <a:t>‹#›</a:t>
             </a:fld>
             <a:endParaRPr lang="en-US"/>
@@ -5073,7 +5102,7 @@
     </p:spTree>
     <p:extLst>
       <p:ext uri="{BB962C8B-B14F-4D97-AF65-F5344CB8AC3E}">
-        <p14:creationId xmlns:p14="http://schemas.microsoft.com/office/powerpoint/2010/main" val="1298913096"/>
+        <p14:creationId xmlns:p14="http://schemas.microsoft.com/office/powerpoint/2010/main" xmlns="" val="1298913096"/>
       </p:ext>
     </p:extLst>
   </p:cSld>
@@ -5083,7 +5112,7 @@
   <p:timing>
     <p:tnLst>
       <p:par>
-        <p:cTn xmlns:p14="http://schemas.microsoft.com/office/powerpoint/2010/main" id="1" dur="indefinite" restart="never" nodeType="tmRoot"/>
+        <p:cTn id="1" dur="indefinite" restart="never" nodeType="tmRoot"/>
       </p:par>
     </p:tnLst>
   </p:timing>
@@ -5172,7 +5201,7 @@
     </p:spTree>
     <p:extLst>
       <p:ext uri="{BB962C8B-B14F-4D97-AF65-F5344CB8AC3E}">
-        <p14:creationId xmlns:p14="http://schemas.microsoft.com/office/powerpoint/2010/main" val="948333926"/>
+        <p14:creationId xmlns:p14="http://schemas.microsoft.com/office/powerpoint/2010/main" xmlns="" val="948333926"/>
       </p:ext>
     </p:extLst>
   </p:cSld>
@@ -5182,7 +5211,7 @@
   <p:timing>
     <p:tnLst>
       <p:par>
-        <p:cTn xmlns:p14="http://schemas.microsoft.com/office/powerpoint/2010/main" id="1" dur="indefinite" restart="never" nodeType="tmRoot"/>
+        <p:cTn id="1" dur="indefinite" restart="never" nodeType="tmRoot"/>
       </p:par>
     </p:tnLst>
   </p:timing>
@@ -5234,10 +5263,10 @@
           <p:nvPr/>
         </p:nvPicPr>
         <p:blipFill>
-          <a:blip r:embed="rId2">
+          <a:blip r:embed="rId2" cstate="print">
             <a:extLst>
               <a:ext uri="{28A0092B-C50C-407E-A947-70E740481C1C}">
-                <a14:useLocalDpi xmlns:a14="http://schemas.microsoft.com/office/drawing/2010/main" val="0"/>
+                <a14:useLocalDpi xmlns:a14="http://schemas.microsoft.com/office/drawing/2010/main" xmlns="" val="0"/>
               </a:ext>
             </a:extLst>
           </a:blip>
@@ -5489,7 +5518,7 @@
     </p:spTree>
     <p:extLst>
       <p:ext uri="{BB962C8B-B14F-4D97-AF65-F5344CB8AC3E}">
-        <p14:creationId xmlns:p14="http://schemas.microsoft.com/office/powerpoint/2010/main" val="2659497869"/>
+        <p14:creationId xmlns:p14="http://schemas.microsoft.com/office/powerpoint/2010/main" xmlns="" val="2659497869"/>
       </p:ext>
     </p:extLst>
   </p:cSld>
@@ -5499,7 +5528,7 @@
   <p:timing>
     <p:tnLst>
       <p:par>
-        <p:cTn xmlns:p14="http://schemas.microsoft.com/office/powerpoint/2010/main" id="1" dur="indefinite" restart="never" nodeType="tmRoot"/>
+        <p:cTn id="1" dur="indefinite" restart="never" nodeType="tmRoot"/>
       </p:par>
     </p:tnLst>
   </p:timing>
@@ -5532,10 +5561,10 @@
           <p:nvPr/>
         </p:nvPicPr>
         <p:blipFill>
-          <a:blip r:embed="rId2">
+          <a:blip r:embed="rId2" cstate="print">
             <a:extLst>
               <a:ext uri="{28A0092B-C50C-407E-A947-70E740481C1C}">
-                <a14:useLocalDpi xmlns:a14="http://schemas.microsoft.com/office/drawing/2010/main" val="0"/>
+                <a14:useLocalDpi xmlns:a14="http://schemas.microsoft.com/office/drawing/2010/main" xmlns="" val="0"/>
               </a:ext>
             </a:extLst>
           </a:blip>
@@ -5639,10 +5668,10 @@
           <p:nvPr/>
         </p:nvPicPr>
         <p:blipFill>
-          <a:blip r:embed="rId3">
+          <a:blip r:embed="rId3" cstate="print">
             <a:extLst>
               <a:ext uri="{28A0092B-C50C-407E-A947-70E740481C1C}">
-                <a14:useLocalDpi xmlns:a14="http://schemas.microsoft.com/office/drawing/2010/main" val="0"/>
+                <a14:useLocalDpi xmlns:a14="http://schemas.microsoft.com/office/drawing/2010/main" xmlns="" val="0"/>
               </a:ext>
             </a:extLst>
           </a:blip>
@@ -5698,8 +5727,64 @@
           <a:lstStyle/>
           <a:p>
             <a:r>
-              <a:rPr lang="en-US"/>
-              <a:t>In vašo oceno delite z ostalimi preko socialnih omrežij!</a:t>
+              <a:rPr lang="en-US" dirty="0"/>
+              <a:t>In </a:t>
+            </a:r>
+            <a:r>
+              <a:rPr lang="en-US" dirty="0" err="1"/>
+              <a:t>vašo</a:t>
+            </a:r>
+            <a:r>
+              <a:rPr lang="en-US" dirty="0"/>
+              <a:t> </a:t>
+            </a:r>
+            <a:r>
+              <a:rPr lang="en-US" dirty="0" err="1"/>
+              <a:t>oceno</a:t>
+            </a:r>
+            <a:r>
+              <a:rPr lang="en-US" dirty="0"/>
+              <a:t> </a:t>
+            </a:r>
+            <a:r>
+              <a:rPr lang="en-US" dirty="0" err="1"/>
+              <a:t>delite</a:t>
+            </a:r>
+            <a:r>
+              <a:rPr lang="en-US" dirty="0"/>
+              <a:t> z </a:t>
+            </a:r>
+            <a:r>
+              <a:rPr lang="en-US" dirty="0" err="1"/>
+              <a:t>ostalimi</a:t>
+            </a:r>
+            <a:r>
+              <a:rPr lang="en-US" dirty="0"/>
+              <a:t> </a:t>
+            </a:r>
+            <a:r>
+              <a:rPr lang="en-US" dirty="0" err="1"/>
+              <a:t>preko</a:t>
+            </a:r>
+            <a:r>
+              <a:rPr lang="en-US" dirty="0"/>
+              <a:t> </a:t>
+            </a:r>
+            <a:r>
+              <a:rPr lang="en-US" dirty="0" err="1"/>
+              <a:t>socialnih</a:t>
+            </a:r>
+            <a:r>
+              <a:rPr lang="en-US" dirty="0"/>
+              <a:t> </a:t>
+            </a:r>
+            <a:r>
+              <a:rPr lang="en-US" dirty="0" err="1"/>
+              <a:t>omrežij</a:t>
+            </a:r>
+            <a:r>
+              <a:rPr lang="en-US" dirty="0"/>
+              <a:t>!</a:t>
             </a:r>
           </a:p>
         </p:txBody>
@@ -5740,7 +5825,7 @@
     </p:spTree>
     <p:extLst>
       <p:ext uri="{BB962C8B-B14F-4D97-AF65-F5344CB8AC3E}">
-        <p14:creationId xmlns:p14="http://schemas.microsoft.com/office/powerpoint/2010/main" val="2314394337"/>
+        <p14:creationId xmlns:p14="http://schemas.microsoft.com/office/powerpoint/2010/main" xmlns="" val="2314394337"/>
       </p:ext>
     </p:extLst>
   </p:cSld>
@@ -5750,7 +5835,7 @@
   <p:timing>
     <p:tnLst>
       <p:par>
-        <p:cTn xmlns:p14="http://schemas.microsoft.com/office/powerpoint/2010/main" id="1" dur="indefinite" restart="never" nodeType="tmRoot">
+        <p:cTn id="1" dur="indefinite" restart="never" nodeType="tmRoot">
           <p:childTnLst>
             <p:seq concurrent="1" nextAc="seek">
               <p:cTn id="2" dur="indefinite" nodeType="mainSeq">
@@ -6073,29 +6158,156 @@
           <a:chExt cx="0" cy="0"/>
         </a:xfrm>
       </p:grpSpPr>
-      <p:sp>
-        <p:nvSpPr>
-          <p:cNvPr id="2" name="Title 1"/>
-          <p:cNvSpPr>
-            <a:spLocks noGrp="1"/>
-          </p:cNvSpPr>
-          <p:nvPr>
-            <p:ph type="title"/>
-          </p:nvPr>
-        </p:nvSpPr>
-        <p:spPr/>
-        <p:txBody>
-          <a:bodyPr/>
+      <p:pic>
+        <p:nvPicPr>
+          <p:cNvPr id="3" name="Picture 2" descr="Screenshot 2015-06-12 07.26.02.png"/>
+          <p:cNvPicPr>
+            <a:picLocks noChangeAspect="1"/>
+          </p:cNvPicPr>
+          <p:nvPr/>
+        </p:nvPicPr>
+        <p:blipFill>
+          <a:blip r:embed="rId2" cstate="print"/>
+          <a:stretch>
+            <a:fillRect/>
+          </a:stretch>
+        </p:blipFill>
+        <p:spPr>
+          <a:xfrm>
+            <a:off x="0" y="580576"/>
+            <a:ext cx="9144000" cy="5297713"/>
+          </a:xfrm>
+          <a:prstGeom prst="rect">
+            <a:avLst/>
+          </a:prstGeom>
+        </p:spPr>
+      </p:pic>
+      <p:sp>
+        <p:nvSpPr>
+          <p:cNvPr id="5" name="TextBox 4"/>
+          <p:cNvSpPr txBox="1"/>
+          <p:nvPr/>
+        </p:nvSpPr>
+        <p:spPr>
+          <a:xfrm>
+            <a:off x="5431413" y="5579756"/>
+            <a:ext cx="3510611" cy="646331"/>
+          </a:xfrm>
+          <a:prstGeom prst="rect">
+            <a:avLst/>
+          </a:prstGeom>
+        </p:spPr>
+        <p:style>
+          <a:lnRef idx="2">
+            <a:schemeClr val="accent1">
+              <a:shade val="50000"/>
+            </a:schemeClr>
+          </a:lnRef>
+          <a:fillRef idx="1">
+            <a:schemeClr val="accent1"/>
+          </a:fillRef>
+          <a:effectRef idx="0">
+            <a:schemeClr val="accent1"/>
+          </a:effectRef>
+          <a:fontRef idx="minor">
+            <a:schemeClr val="lt1"/>
+          </a:fontRef>
+        </p:style>
+        <p:txBody>
+          <a:bodyPr wrap="square" rtlCol="0">
+            <a:spAutoFit/>
+          </a:bodyPr>
           <a:lstStyle/>
           <a:p>
-            <a:endParaRPr lang="en-US"/>
-          </a:p>
-        </p:txBody>
-      </p:sp>
+            <a:r>
+              <a:rPr lang="en-US" dirty="0" err="1" smtClean="0"/>
+              <a:t>Lahko</a:t>
+            </a:r>
+            <a:r>
+              <a:rPr lang="en-US" dirty="0" smtClean="0"/>
+              <a:t> </a:t>
+            </a:r>
+            <a:r>
+              <a:rPr lang="en-US" dirty="0" err="1" smtClean="0"/>
+              <a:t>si</a:t>
+            </a:r>
+            <a:r>
+              <a:rPr lang="en-US" dirty="0" smtClean="0"/>
+              <a:t> </a:t>
+            </a:r>
+            <a:r>
+              <a:rPr lang="en-US" dirty="0" err="1" smtClean="0"/>
+              <a:t>pogledas</a:t>
+            </a:r>
+            <a:r>
+              <a:rPr lang="en-US" dirty="0" smtClean="0"/>
+              <a:t> </a:t>
+            </a:r>
+            <a:r>
+              <a:rPr lang="en-US" dirty="0" err="1" smtClean="0"/>
+              <a:t>ali</a:t>
+            </a:r>
+            <a:r>
+              <a:rPr lang="en-US" dirty="0" smtClean="0"/>
+              <a:t> se film </a:t>
+            </a:r>
+            <a:r>
+              <a:rPr lang="en-US" dirty="0" err="1" smtClean="0"/>
+              <a:t>predvaja</a:t>
+            </a:r>
+            <a:r>
+              <a:rPr lang="en-US" dirty="0" smtClean="0"/>
+              <a:t> </a:t>
+            </a:r>
+            <a:r>
+              <a:rPr lang="en-US" dirty="0" err="1" smtClean="0"/>
+              <a:t>na</a:t>
+            </a:r>
+            <a:r>
+              <a:rPr lang="en-US" dirty="0" smtClean="0"/>
+              <a:t> TV</a:t>
+            </a:r>
+            <a:endParaRPr lang="en-US" dirty="0"/>
+          </a:p>
+        </p:txBody>
+      </p:sp>
+      <p:cxnSp>
+        <p:nvCxnSpPr>
+          <p:cNvPr id="6" name="Straight Arrow Connector 5"/>
+          <p:cNvCxnSpPr/>
+          <p:nvPr/>
+        </p:nvCxnSpPr>
+        <p:spPr>
+          <a:xfrm flipH="1" flipV="1">
+            <a:off x="4760686" y="5579756"/>
+            <a:ext cx="670727" cy="111802"/>
+          </a:xfrm>
+          <a:prstGeom prst="straightConnector1">
+            <a:avLst/>
+          </a:prstGeom>
+          <a:ln w="57150" cmpd="sng">
+            <a:tailEnd type="arrow"/>
+          </a:ln>
+        </p:spPr>
+        <p:style>
+          <a:lnRef idx="2">
+            <a:schemeClr val="accent1"/>
+          </a:lnRef>
+          <a:fillRef idx="0">
+            <a:schemeClr val="accent1"/>
+          </a:fillRef>
+          <a:effectRef idx="1">
+            <a:schemeClr val="accent1"/>
+          </a:effectRef>
+          <a:fontRef idx="minor">
+            <a:schemeClr val="tx1"/>
+          </a:fontRef>
+        </p:style>
+      </p:cxnSp>
     </p:spTree>
     <p:extLst>
       <p:ext uri="{BB962C8B-B14F-4D97-AF65-F5344CB8AC3E}">
-        <p14:creationId xmlns:p14="http://schemas.microsoft.com/office/powerpoint/2010/main" val="3022251980"/>
+        <p14:creationId xmlns:p14="http://schemas.microsoft.com/office/powerpoint/2010/main" xmlns="" val="3022251980"/>
       </p:ext>
     </p:extLst>
   </p:cSld>
@@ -6105,9 +6317,599 @@
   <p:timing>
     <p:tnLst>
       <p:par>
-        <p:cTn xmlns:p14="http://schemas.microsoft.com/office/powerpoint/2010/main" id="1" dur="indefinite" restart="never" nodeType="tmRoot"/>
+        <p:cTn id="1" dur="indefinite" restart="never" nodeType="tmRoot">
+          <p:childTnLst>
+            <p:seq concurrent="1" nextAc="seek">
+              <p:cTn id="2" dur="indefinite" nodeType="mainSeq">
+                <p:childTnLst>
+                  <p:par>
+                    <p:cTn id="3" fill="hold">
+                      <p:stCondLst>
+                        <p:cond delay="indefinite"/>
+                      </p:stCondLst>
+                      <p:childTnLst>
+                        <p:par>
+                          <p:cTn id="4" fill="hold">
+                            <p:stCondLst>
+                              <p:cond delay="0"/>
+                            </p:stCondLst>
+                            <p:childTnLst>
+                              <p:par>
+                                <p:cTn id="5" presetID="2" presetClass="entr" presetSubtype="4" fill="hold" nodeType="clickEffect">
+                                  <p:stCondLst>
+                                    <p:cond delay="0"/>
+                                  </p:stCondLst>
+                                  <p:childTnLst>
+                                    <p:set>
+                                      <p:cBhvr>
+                                        <p:cTn id="6" dur="1" fill="hold">
+                                          <p:stCondLst>
+                                            <p:cond delay="0"/>
+                                          </p:stCondLst>
+                                        </p:cTn>
+                                        <p:tgtEl>
+                                          <p:spTgt spid="6"/>
+                                        </p:tgtEl>
+                                        <p:attrNameLst>
+                                          <p:attrName>style.visibility</p:attrName>
+                                        </p:attrNameLst>
+                                      </p:cBhvr>
+                                      <p:to>
+                                        <p:strVal val="visible"/>
+                                      </p:to>
+                                    </p:set>
+                                    <p:anim calcmode="lin" valueType="num">
+                                      <p:cBhvr additive="base">
+                                        <p:cTn id="7" dur="210" fill="hold"/>
+                                        <p:tgtEl>
+                                          <p:spTgt spid="6"/>
+                                        </p:tgtEl>
+                                        <p:attrNameLst>
+                                          <p:attrName>ppt_x</p:attrName>
+                                        </p:attrNameLst>
+                                      </p:cBhvr>
+                                      <p:tavLst>
+                                        <p:tav tm="0">
+                                          <p:val>
+                                            <p:strVal val="#ppt_x"/>
+                                          </p:val>
+                                        </p:tav>
+                                        <p:tav tm="100000">
+                                          <p:val>
+                                            <p:strVal val="#ppt_x"/>
+                                          </p:val>
+                                        </p:tav>
+                                      </p:tavLst>
+                                    </p:anim>
+                                    <p:anim calcmode="lin" valueType="num">
+                                      <p:cBhvr additive="base">
+                                        <p:cTn id="8" dur="210" fill="hold"/>
+                                        <p:tgtEl>
+                                          <p:spTgt spid="6"/>
+                                        </p:tgtEl>
+                                        <p:attrNameLst>
+                                          <p:attrName>ppt_y</p:attrName>
+                                        </p:attrNameLst>
+                                      </p:cBhvr>
+                                      <p:tavLst>
+                                        <p:tav tm="0">
+                                          <p:val>
+                                            <p:strVal val="1+#ppt_h/2"/>
+                                          </p:val>
+                                        </p:tav>
+                                        <p:tav tm="100000">
+                                          <p:val>
+                                            <p:strVal val="#ppt_y"/>
+                                          </p:val>
+                                        </p:tav>
+                                      </p:tavLst>
+                                    </p:anim>
+                                  </p:childTnLst>
+                                </p:cTn>
+                              </p:par>
+                            </p:childTnLst>
+                          </p:cTn>
+                        </p:par>
+                      </p:childTnLst>
+                    </p:cTn>
+                  </p:par>
+                  <p:par>
+                    <p:cTn id="9" fill="hold">
+                      <p:stCondLst>
+                        <p:cond delay="indefinite"/>
+                      </p:stCondLst>
+                      <p:childTnLst>
+                        <p:par>
+                          <p:cTn id="10" fill="hold">
+                            <p:stCondLst>
+                              <p:cond delay="0"/>
+                            </p:stCondLst>
+                            <p:childTnLst>
+                              <p:par>
+                                <p:cTn id="11" presetID="2" presetClass="entr" presetSubtype="4" fill="hold" grpId="0" nodeType="clickEffect">
+                                  <p:stCondLst>
+                                    <p:cond delay="0"/>
+                                  </p:stCondLst>
+                                  <p:childTnLst>
+                                    <p:set>
+                                      <p:cBhvr>
+                                        <p:cTn id="12" dur="1" fill="hold">
+                                          <p:stCondLst>
+                                            <p:cond delay="0"/>
+                                          </p:stCondLst>
+                                        </p:cTn>
+                                        <p:tgtEl>
+                                          <p:spTgt spid="5"/>
+                                        </p:tgtEl>
+                                        <p:attrNameLst>
+                                          <p:attrName>style.visibility</p:attrName>
+                                        </p:attrNameLst>
+                                      </p:cBhvr>
+                                      <p:to>
+                                        <p:strVal val="visible"/>
+                                      </p:to>
+                                    </p:set>
+                                    <p:anim calcmode="lin" valueType="num">
+                                      <p:cBhvr additive="base">
+                                        <p:cTn id="13" dur="210" fill="hold"/>
+                                        <p:tgtEl>
+                                          <p:spTgt spid="5"/>
+                                        </p:tgtEl>
+                                        <p:attrNameLst>
+                                          <p:attrName>ppt_x</p:attrName>
+                                        </p:attrNameLst>
+                                      </p:cBhvr>
+                                      <p:tavLst>
+                                        <p:tav tm="0">
+                                          <p:val>
+                                            <p:strVal val="#ppt_x"/>
+                                          </p:val>
+                                        </p:tav>
+                                        <p:tav tm="100000">
+                                          <p:val>
+                                            <p:strVal val="#ppt_x"/>
+                                          </p:val>
+                                        </p:tav>
+                                      </p:tavLst>
+                                    </p:anim>
+                                    <p:anim calcmode="lin" valueType="num">
+                                      <p:cBhvr additive="base">
+                                        <p:cTn id="14" dur="210" fill="hold"/>
+                                        <p:tgtEl>
+                                          <p:spTgt spid="5"/>
+                                        </p:tgtEl>
+                                        <p:attrNameLst>
+                                          <p:attrName>ppt_y</p:attrName>
+                                        </p:attrNameLst>
+                                      </p:cBhvr>
+                                      <p:tavLst>
+                                        <p:tav tm="0">
+                                          <p:val>
+                                            <p:strVal val="1+#ppt_h/2"/>
+                                          </p:val>
+                                        </p:tav>
+                                        <p:tav tm="100000">
+                                          <p:val>
+                                            <p:strVal val="#ppt_y"/>
+                                          </p:val>
+                                        </p:tav>
+                                      </p:tavLst>
+                                    </p:anim>
+                                  </p:childTnLst>
+                                </p:cTn>
+                              </p:par>
+                            </p:childTnLst>
+                          </p:cTn>
+                        </p:par>
+                      </p:childTnLst>
+                    </p:cTn>
+                  </p:par>
+                </p:childTnLst>
+              </p:cTn>
+              <p:prevCondLst>
+                <p:cond evt="onPrev" delay="0">
+                  <p:tgtEl>
+                    <p:sldTgt/>
+                  </p:tgtEl>
+                </p:cond>
+              </p:prevCondLst>
+              <p:nextCondLst>
+                <p:cond evt="onNext" delay="0">
+                  <p:tgtEl>
+                    <p:sldTgt/>
+                  </p:tgtEl>
+                </p:cond>
+              </p:nextCondLst>
+            </p:seq>
+          </p:childTnLst>
+        </p:cTn>
       </p:par>
     </p:tnLst>
+    <p:bldLst>
+      <p:bldP spid="5" grpId="0" animBg="1"/>
+    </p:bldLst>
+  </p:timing>
+</p:sld>
+</file>
+
+<file path=ppt/slides/slide6.xml><?xml version="1.0" encoding="utf-8"?>
+<p:sld xmlns:a="http://schemas.openxmlformats.org/drawingml/2006/main" xmlns:r="http://schemas.openxmlformats.org/officeDocument/2006/relationships" xmlns:p="http://schemas.openxmlformats.org/presentationml/2006/main">
+  <p:cSld>
+    <p:spTree>
+      <p:nvGrpSpPr>
+        <p:cNvPr id="1" name=""/>
+        <p:cNvGrpSpPr/>
+        <p:nvPr/>
+      </p:nvGrpSpPr>
+      <p:grpSpPr>
+        <a:xfrm>
+          <a:off x="0" y="0"/>
+          <a:ext cx="0" cy="0"/>
+          <a:chOff x="0" y="0"/>
+          <a:chExt cx="0" cy="0"/>
+        </a:xfrm>
+      </p:grpSpPr>
+      <p:pic>
+        <p:nvPicPr>
+          <p:cNvPr id="4" name="Picture 3" descr="Screenshot 2015-06-12 07.27.11.png"/>
+          <p:cNvPicPr>
+            <a:picLocks noChangeAspect="1"/>
+          </p:cNvPicPr>
+          <p:nvPr/>
+        </p:nvPicPr>
+        <p:blipFill>
+          <a:blip r:embed="rId2" cstate="print"/>
+          <a:stretch>
+            <a:fillRect/>
+          </a:stretch>
+        </p:blipFill>
+        <p:spPr>
+          <a:xfrm>
+            <a:off x="359531" y="756746"/>
+            <a:ext cx="8573454" cy="4631180"/>
+          </a:xfrm>
+          <a:prstGeom prst="rect">
+            <a:avLst/>
+          </a:prstGeom>
+        </p:spPr>
+      </p:pic>
+      <p:sp>
+        <p:nvSpPr>
+          <p:cNvPr id="5" name="TextBox 4"/>
+          <p:cNvSpPr txBox="1"/>
+          <p:nvPr/>
+        </p:nvSpPr>
+        <p:spPr>
+          <a:xfrm>
+            <a:off x="5431413" y="5579756"/>
+            <a:ext cx="3510611" cy="646331"/>
+          </a:xfrm>
+          <a:prstGeom prst="rect">
+            <a:avLst/>
+          </a:prstGeom>
+        </p:spPr>
+        <p:style>
+          <a:lnRef idx="2">
+            <a:schemeClr val="accent1">
+              <a:shade val="50000"/>
+            </a:schemeClr>
+          </a:lnRef>
+          <a:fillRef idx="1">
+            <a:schemeClr val="accent1"/>
+          </a:fillRef>
+          <a:effectRef idx="0">
+            <a:schemeClr val="accent1"/>
+          </a:effectRef>
+          <a:fontRef idx="minor">
+            <a:schemeClr val="lt1"/>
+          </a:fontRef>
+        </p:style>
+        <p:txBody>
+          <a:bodyPr wrap="square" rtlCol="0">
+            <a:spAutoFit/>
+          </a:bodyPr>
+          <a:lstStyle/>
+          <a:p>
+            <a:r>
+              <a:rPr lang="en-US" dirty="0" err="1" smtClean="0"/>
+              <a:t>Lahko</a:t>
+            </a:r>
+            <a:r>
+              <a:rPr lang="en-US" dirty="0" smtClean="0"/>
+              <a:t> </a:t>
+            </a:r>
+            <a:r>
+              <a:rPr lang="en-US" dirty="0" err="1" smtClean="0"/>
+              <a:t>si</a:t>
+            </a:r>
+            <a:r>
+              <a:rPr lang="en-US" dirty="0" smtClean="0"/>
+              <a:t> </a:t>
+            </a:r>
+            <a:r>
+              <a:rPr lang="en-US" dirty="0" err="1" smtClean="0"/>
+              <a:t>pogledas</a:t>
+            </a:r>
+            <a:r>
+              <a:rPr lang="en-US" dirty="0" smtClean="0"/>
+              <a:t> </a:t>
+            </a:r>
+            <a:r>
+              <a:rPr lang="en-US" dirty="0" err="1" smtClean="0"/>
+              <a:t>ali</a:t>
+            </a:r>
+            <a:r>
+              <a:rPr lang="en-US" dirty="0" smtClean="0"/>
+              <a:t> se film </a:t>
+            </a:r>
+            <a:r>
+              <a:rPr lang="en-US" dirty="0" err="1" smtClean="0"/>
+              <a:t>predvaja</a:t>
+            </a:r>
+            <a:r>
+              <a:rPr lang="en-US" dirty="0" smtClean="0"/>
+              <a:t> v </a:t>
+            </a:r>
+            <a:r>
+              <a:rPr lang="en-US" dirty="0" err="1" smtClean="0"/>
+              <a:t>kinu</a:t>
+            </a:r>
+            <a:endParaRPr lang="en-US" dirty="0"/>
+          </a:p>
+        </p:txBody>
+      </p:sp>
+      <p:cxnSp>
+        <p:nvCxnSpPr>
+          <p:cNvPr id="6" name="Straight Arrow Connector 5"/>
+          <p:cNvCxnSpPr/>
+          <p:nvPr/>
+        </p:nvCxnSpPr>
+        <p:spPr>
+          <a:xfrm flipH="1" flipV="1">
+            <a:off x="4760686" y="5387926"/>
+            <a:ext cx="670728" cy="303632"/>
+          </a:xfrm>
+          <a:prstGeom prst="straightConnector1">
+            <a:avLst/>
+          </a:prstGeom>
+          <a:ln w="57150" cmpd="sng">
+            <a:tailEnd type="arrow"/>
+          </a:ln>
+        </p:spPr>
+        <p:style>
+          <a:lnRef idx="2">
+            <a:schemeClr val="accent1"/>
+          </a:lnRef>
+          <a:fillRef idx="0">
+            <a:schemeClr val="accent1"/>
+          </a:fillRef>
+          <a:effectRef idx="1">
+            <a:schemeClr val="accent1"/>
+          </a:effectRef>
+          <a:fontRef idx="minor">
+            <a:schemeClr val="tx1"/>
+          </a:fontRef>
+        </p:style>
+      </p:cxnSp>
+    </p:spTree>
+  </p:cSld>
+  <p:clrMapOvr>
+    <a:masterClrMapping/>
+  </p:clrMapOvr>
+  <p:timing>
+    <p:tnLst>
+      <p:par>
+        <p:cTn id="1" dur="indefinite" restart="never" nodeType="tmRoot">
+          <p:childTnLst>
+            <p:seq concurrent="1" nextAc="seek">
+              <p:cTn id="2" dur="indefinite" nodeType="mainSeq">
+                <p:childTnLst>
+                  <p:par>
+                    <p:cTn id="3" fill="hold">
+                      <p:stCondLst>
+                        <p:cond delay="indefinite"/>
+                      </p:stCondLst>
+                      <p:childTnLst>
+                        <p:par>
+                          <p:cTn id="4" fill="hold">
+                            <p:stCondLst>
+                              <p:cond delay="0"/>
+                            </p:stCondLst>
+                            <p:childTnLst>
+                              <p:par>
+                                <p:cTn id="5" presetID="2" presetClass="entr" presetSubtype="4" fill="hold" nodeType="clickEffect">
+                                  <p:stCondLst>
+                                    <p:cond delay="0"/>
+                                  </p:stCondLst>
+                                  <p:childTnLst>
+                                    <p:set>
+                                      <p:cBhvr>
+                                        <p:cTn id="6" dur="1" fill="hold">
+                                          <p:stCondLst>
+                                            <p:cond delay="0"/>
+                                          </p:stCondLst>
+                                        </p:cTn>
+                                        <p:tgtEl>
+                                          <p:spTgt spid="6"/>
+                                        </p:tgtEl>
+                                        <p:attrNameLst>
+                                          <p:attrName>style.visibility</p:attrName>
+                                        </p:attrNameLst>
+                                      </p:cBhvr>
+                                      <p:to>
+                                        <p:strVal val="visible"/>
+                                      </p:to>
+                                    </p:set>
+                                    <p:anim calcmode="lin" valueType="num">
+                                      <p:cBhvr additive="base">
+                                        <p:cTn id="7" dur="210" fill="hold"/>
+                                        <p:tgtEl>
+                                          <p:spTgt spid="6"/>
+                                        </p:tgtEl>
+                                        <p:attrNameLst>
+                                          <p:attrName>ppt_x</p:attrName>
+                                        </p:attrNameLst>
+                                      </p:cBhvr>
+                                      <p:tavLst>
+                                        <p:tav tm="0">
+                                          <p:val>
+                                            <p:strVal val="#ppt_x"/>
+                                          </p:val>
+                                        </p:tav>
+                                        <p:tav tm="100000">
+                                          <p:val>
+                                            <p:strVal val="#ppt_x"/>
+                                          </p:val>
+                                        </p:tav>
+                                      </p:tavLst>
+                                    </p:anim>
+                                    <p:anim calcmode="lin" valueType="num">
+                                      <p:cBhvr additive="base">
+                                        <p:cTn id="8" dur="210" fill="hold"/>
+                                        <p:tgtEl>
+                                          <p:spTgt spid="6"/>
+                                        </p:tgtEl>
+                                        <p:attrNameLst>
+                                          <p:attrName>ppt_y</p:attrName>
+                                        </p:attrNameLst>
+                                      </p:cBhvr>
+                                      <p:tavLst>
+                                        <p:tav tm="0">
+                                          <p:val>
+                                            <p:strVal val="1+#ppt_h/2"/>
+                                          </p:val>
+                                        </p:tav>
+                                        <p:tav tm="100000">
+                                          <p:val>
+                                            <p:strVal val="#ppt_y"/>
+                                          </p:val>
+                                        </p:tav>
+                                      </p:tavLst>
+                                    </p:anim>
+                                  </p:childTnLst>
+                                </p:cTn>
+                              </p:par>
+                            </p:childTnLst>
+                          </p:cTn>
+                        </p:par>
+                      </p:childTnLst>
+                    </p:cTn>
+                  </p:par>
+                  <p:par>
+                    <p:cTn id="9" fill="hold">
+                      <p:stCondLst>
+                        <p:cond delay="indefinite"/>
+                      </p:stCondLst>
+                      <p:childTnLst>
+                        <p:par>
+                          <p:cTn id="10" fill="hold">
+                            <p:stCondLst>
+                              <p:cond delay="0"/>
+                            </p:stCondLst>
+                            <p:childTnLst>
+                              <p:par>
+                                <p:cTn id="11" presetID="2" presetClass="entr" presetSubtype="4" fill="hold" grpId="0" nodeType="clickEffect">
+                                  <p:stCondLst>
+                                    <p:cond delay="0"/>
+                                  </p:stCondLst>
+                                  <p:childTnLst>
+                                    <p:set>
+                                      <p:cBhvr>
+                                        <p:cTn id="12" dur="1" fill="hold">
+                                          <p:stCondLst>
+                                            <p:cond delay="0"/>
+                                          </p:stCondLst>
+                                        </p:cTn>
+                                        <p:tgtEl>
+                                          <p:spTgt spid="5"/>
+                                        </p:tgtEl>
+                                        <p:attrNameLst>
+                                          <p:attrName>style.visibility</p:attrName>
+                                        </p:attrNameLst>
+                                      </p:cBhvr>
+                                      <p:to>
+                                        <p:strVal val="visible"/>
+                                      </p:to>
+                                    </p:set>
+                                    <p:anim calcmode="lin" valueType="num">
+                                      <p:cBhvr additive="base">
+                                        <p:cTn id="13" dur="210" fill="hold"/>
+                                        <p:tgtEl>
+                                          <p:spTgt spid="5"/>
+                                        </p:tgtEl>
+                                        <p:attrNameLst>
+                                          <p:attrName>ppt_x</p:attrName>
+                                        </p:attrNameLst>
+                                      </p:cBhvr>
+                                      <p:tavLst>
+                                        <p:tav tm="0">
+                                          <p:val>
+                                            <p:strVal val="#ppt_x"/>
+                                          </p:val>
+                                        </p:tav>
+                                        <p:tav tm="100000">
+                                          <p:val>
+                                            <p:strVal val="#ppt_x"/>
+                                          </p:val>
+                                        </p:tav>
+                                      </p:tavLst>
+                                    </p:anim>
+                                    <p:anim calcmode="lin" valueType="num">
+                                      <p:cBhvr additive="base">
+                                        <p:cTn id="14" dur="210" fill="hold"/>
+                                        <p:tgtEl>
+                                          <p:spTgt spid="5"/>
+                                        </p:tgtEl>
+                                        <p:attrNameLst>
+                                          <p:attrName>ppt_y</p:attrName>
+                                        </p:attrNameLst>
+                                      </p:cBhvr>
+                                      <p:tavLst>
+                                        <p:tav tm="0">
+                                          <p:val>
+                                            <p:strVal val="1+#ppt_h/2"/>
+                                          </p:val>
+                                        </p:tav>
+                                        <p:tav tm="100000">
+                                          <p:val>
+                                            <p:strVal val="#ppt_y"/>
+                                          </p:val>
+                                        </p:tav>
+                                      </p:tavLst>
+                                    </p:anim>
+                                  </p:childTnLst>
+                                </p:cTn>
+                              </p:par>
+                            </p:childTnLst>
+                          </p:cTn>
+                        </p:par>
+                      </p:childTnLst>
+                    </p:cTn>
+                  </p:par>
+                </p:childTnLst>
+              </p:cTn>
+              <p:prevCondLst>
+                <p:cond evt="onPrev" delay="0">
+                  <p:tgtEl>
+                    <p:sldTgt/>
+                  </p:tgtEl>
+                </p:cond>
+              </p:prevCondLst>
+              <p:nextCondLst>
+                <p:cond evt="onNext" delay="0">
+                  <p:tgtEl>
+                    <p:sldTgt/>
+                  </p:tgtEl>
+                </p:cond>
+              </p:nextCondLst>
+            </p:seq>
+          </p:childTnLst>
+        </p:cTn>
+      </p:par>
+    </p:tnLst>
+    <p:bldLst>
+      <p:bldP spid="5" grpId="0" animBg="1"/>
+    </p:bldLst>
   </p:timing>
 </p:sld>
 </file>

</xml_diff>